<commit_message>
Update videos and fix bugs
</commit_message>
<xml_diff>
--- a/_site/slides/sesion11/Sesion4_extra_confusion_ajuste.pptx
+++ b/_site/slides/sesion11/Sesion4_extra_confusion_ajuste.pptx
@@ -298,7 +298,7 @@
           <a:p>
             <a:fld id="{29F171D4-9699-4212-B46B-F0F1FE2A1320}" type="datetimeFigureOut">
               <a:rPr lang="en-GB" smtClean="0"/>
-              <a:t>25/10/2022</a:t>
+              <a:t>26/10/2022</a:t>
             </a:fld>
             <a:endParaRPr lang="en-GB"/>
           </a:p>
@@ -918,7 +918,7 @@
           <a:p>
             <a:fld id="{8F9019BF-AD1C-452D-8DF4-3C2EDFB031C4}" type="datetimeFigureOut">
               <a:rPr lang="en-GB" smtClean="0"/>
-              <a:t>25/10/2022</a:t>
+              <a:t>26/10/2022</a:t>
             </a:fld>
             <a:endParaRPr lang="en-GB"/>
           </a:p>
@@ -1083,7 +1083,7 @@
           <a:p>
             <a:fld id="{8F9019BF-AD1C-452D-8DF4-3C2EDFB031C4}" type="datetimeFigureOut">
               <a:rPr lang="en-GB" smtClean="0"/>
-              <a:t>25/10/2022</a:t>
+              <a:t>26/10/2022</a:t>
             </a:fld>
             <a:endParaRPr lang="en-GB"/>
           </a:p>
@@ -1258,7 +1258,7 @@
           <a:p>
             <a:fld id="{8F9019BF-AD1C-452D-8DF4-3C2EDFB031C4}" type="datetimeFigureOut">
               <a:rPr lang="en-GB" smtClean="0"/>
-              <a:t>25/10/2022</a:t>
+              <a:t>26/10/2022</a:t>
             </a:fld>
             <a:endParaRPr lang="en-GB"/>
           </a:p>
@@ -1423,7 +1423,7 @@
           <a:p>
             <a:fld id="{8F9019BF-AD1C-452D-8DF4-3C2EDFB031C4}" type="datetimeFigureOut">
               <a:rPr lang="en-GB" smtClean="0"/>
-              <a:t>25/10/2022</a:t>
+              <a:t>26/10/2022</a:t>
             </a:fld>
             <a:endParaRPr lang="en-GB"/>
           </a:p>
@@ -1664,7 +1664,7 @@
           <a:p>
             <a:fld id="{8F9019BF-AD1C-452D-8DF4-3C2EDFB031C4}" type="datetimeFigureOut">
               <a:rPr lang="en-GB" smtClean="0"/>
-              <a:t>25/10/2022</a:t>
+              <a:t>26/10/2022</a:t>
             </a:fld>
             <a:endParaRPr lang="en-GB"/>
           </a:p>
@@ -1947,7 +1947,7 @@
           <a:p>
             <a:fld id="{8F9019BF-AD1C-452D-8DF4-3C2EDFB031C4}" type="datetimeFigureOut">
               <a:rPr lang="en-GB" smtClean="0"/>
-              <a:t>25/10/2022</a:t>
+              <a:t>26/10/2022</a:t>
             </a:fld>
             <a:endParaRPr lang="en-GB"/>
           </a:p>
@@ -2364,7 +2364,7 @@
           <a:p>
             <a:fld id="{8F9019BF-AD1C-452D-8DF4-3C2EDFB031C4}" type="datetimeFigureOut">
               <a:rPr lang="en-GB" smtClean="0"/>
-              <a:t>25/10/2022</a:t>
+              <a:t>26/10/2022</a:t>
             </a:fld>
             <a:endParaRPr lang="en-GB"/>
           </a:p>
@@ -2477,7 +2477,7 @@
           <a:p>
             <a:fld id="{8F9019BF-AD1C-452D-8DF4-3C2EDFB031C4}" type="datetimeFigureOut">
               <a:rPr lang="en-GB" smtClean="0"/>
-              <a:t>25/10/2022</a:t>
+              <a:t>26/10/2022</a:t>
             </a:fld>
             <a:endParaRPr lang="en-GB"/>
           </a:p>
@@ -2567,7 +2567,7 @@
           <a:p>
             <a:fld id="{8F9019BF-AD1C-452D-8DF4-3C2EDFB031C4}" type="datetimeFigureOut">
               <a:rPr lang="en-GB" smtClean="0"/>
-              <a:t>25/10/2022</a:t>
+              <a:t>26/10/2022</a:t>
             </a:fld>
             <a:endParaRPr lang="en-GB"/>
           </a:p>
@@ -2839,7 +2839,7 @@
           <a:p>
             <a:fld id="{8F9019BF-AD1C-452D-8DF4-3C2EDFB031C4}" type="datetimeFigureOut">
               <a:rPr lang="en-GB" smtClean="0"/>
-              <a:t>25/10/2022</a:t>
+              <a:t>26/10/2022</a:t>
             </a:fld>
             <a:endParaRPr lang="en-GB"/>
           </a:p>
@@ -3087,7 +3087,7 @@
           <a:p>
             <a:fld id="{8F9019BF-AD1C-452D-8DF4-3C2EDFB031C4}" type="datetimeFigureOut">
               <a:rPr lang="en-GB" smtClean="0"/>
-              <a:t>25/10/2022</a:t>
+              <a:t>26/10/2022</a:t>
             </a:fld>
             <a:endParaRPr lang="en-GB"/>
           </a:p>
@@ -3295,7 +3295,7 @@
           <a:p>
             <a:fld id="{8F9019BF-AD1C-452D-8DF4-3C2EDFB031C4}" type="datetimeFigureOut">
               <a:rPr lang="en-GB" smtClean="0"/>
-              <a:t>25/10/2022</a:t>
+              <a:t>26/10/2022</a:t>
             </a:fld>
             <a:endParaRPr lang="en-GB"/>
           </a:p>
@@ -11882,349 +11882,703 @@
           <a:chExt cx="0" cy="0"/>
         </a:xfrm>
       </p:grpSpPr>
-      <p:graphicFrame>
-        <p:nvGraphicFramePr>
-          <p:cNvPr id="4" name="Marcador de contenido 4">
-            <a:extLst>
-              <a:ext uri="{FF2B5EF4-FFF2-40B4-BE49-F238E27FC236}">
-                <a16:creationId xmlns:a16="http://schemas.microsoft.com/office/drawing/2014/main" id="{C0004BE9-6D29-40F0-9856-FA92943BBEE7}"/>
-              </a:ext>
-            </a:extLst>
-          </p:cNvPr>
-          <p:cNvGraphicFramePr>
-            <a:graphicFrameLocks/>
-          </p:cNvGraphicFramePr>
-          <p:nvPr>
-            <p:extLst>
-              <p:ext uri="{D42A27DB-BD31-4B8C-83A1-F6EECF244321}">
-                <p14:modId xmlns:p14="http://schemas.microsoft.com/office/powerpoint/2010/main" val="3162889275"/>
-              </p:ext>
-            </p:extLst>
-          </p:nvPr>
-        </p:nvGraphicFramePr>
-        <p:xfrm>
-          <a:off x="512413" y="1837317"/>
-          <a:ext cx="8119171" cy="1463040"/>
-        </p:xfrm>
-        <a:graphic>
-          <a:graphicData uri="http://schemas.openxmlformats.org/drawingml/2006/table">
-            <a:tbl>
-              <a:tblPr firstRow="1" bandRow="1">
-                <a:tableStyleId>{5940675A-B579-460E-94D1-54222C63F5DA}</a:tableStyleId>
-              </a:tblPr>
-              <a:tblGrid>
-                <a:gridCol w="1494435">
-                  <a:extLst>
-                    <a:ext uri="{9D8B030D-6E8A-4147-A177-3AD203B41FA5}">
-                      <a16:colId xmlns:a16="http://schemas.microsoft.com/office/drawing/2014/main" val="3492540604"/>
-                    </a:ext>
-                  </a:extLst>
-                </a:gridCol>
-                <a:gridCol w="2093494">
-                  <a:extLst>
-                    <a:ext uri="{9D8B030D-6E8A-4147-A177-3AD203B41FA5}">
-                      <a16:colId xmlns:a16="http://schemas.microsoft.com/office/drawing/2014/main" val="2145709817"/>
-                    </a:ext>
-                  </a:extLst>
-                </a:gridCol>
-                <a:gridCol w="2520280">
-                  <a:extLst>
-                    <a:ext uri="{9D8B030D-6E8A-4147-A177-3AD203B41FA5}">
-                      <a16:colId xmlns:a16="http://schemas.microsoft.com/office/drawing/2014/main" val="41199867"/>
-                    </a:ext>
-                  </a:extLst>
-                </a:gridCol>
-                <a:gridCol w="2010962">
-                  <a:extLst>
-                    <a:ext uri="{9D8B030D-6E8A-4147-A177-3AD203B41FA5}">
-                      <a16:colId xmlns:a16="http://schemas.microsoft.com/office/drawing/2014/main" val="2783525654"/>
-                    </a:ext>
-                  </a:extLst>
-                </a:gridCol>
-              </a:tblGrid>
-              <a:tr h="611803">
-                <a:tc>
-                  <a:txBody>
-                    <a:bodyPr/>
-                    <a:lstStyle/>
-                    <a:p>
-                      <a:endParaRPr lang="es-PE" sz="1500" dirty="0"/>
-                    </a:p>
-                  </a:txBody>
-                  <a:tcPr marL="68580" marR="68580" marT="34290" marB="34290"/>
-                </a:tc>
-                <a:tc>
-                  <a:txBody>
-                    <a:bodyPr/>
-                    <a:lstStyle/>
-                    <a:p>
-                      <a:pPr algn="ctr"/>
-                      <a:r>
-                        <a:rPr lang="es-ES" sz="1800" b="1" dirty="0"/>
-                        <a:t>Fuma</a:t>
-                      </a:r>
-                    </a:p>
-                    <a:p>
-                      <a:pPr algn="ctr"/>
-                      <a:r>
-                        <a:rPr lang="es-ES" sz="1800" b="1" dirty="0"/>
-                        <a:t>(promedio de VEF)</a:t>
-                      </a:r>
-                      <a:endParaRPr lang="es-PE" sz="1800" b="1" dirty="0"/>
-                    </a:p>
-                  </a:txBody>
-                  <a:tcPr marL="68580" marR="68580" marT="34290" marB="34290"/>
-                </a:tc>
-                <a:tc>
-                  <a:txBody>
-                    <a:bodyPr/>
-                    <a:lstStyle/>
-                    <a:p>
-                      <a:pPr algn="ctr"/>
-                      <a:r>
-                        <a:rPr lang="es-ES" sz="1800" b="1" dirty="0"/>
-                        <a:t>No fuma</a:t>
-                      </a:r>
-                    </a:p>
-                    <a:p>
-                      <a:pPr algn="ctr"/>
-                      <a:r>
-                        <a:rPr lang="es-ES" sz="1800" b="1" dirty="0"/>
-                        <a:t>(promedio de VEF)</a:t>
-                      </a:r>
-                      <a:endParaRPr lang="es-PE" sz="1800" b="1" dirty="0"/>
-                    </a:p>
-                  </a:txBody>
-                  <a:tcPr marL="68580" marR="68580" marT="34290" marB="34290"/>
-                </a:tc>
-                <a:tc>
-                  <a:txBody>
-                    <a:bodyPr/>
-                    <a:lstStyle/>
-                    <a:p>
-                      <a:pPr algn="ctr"/>
-                      <a:r>
-                        <a:rPr lang="es-PE" sz="2800" b="1" dirty="0" err="1"/>
-                        <a:t>b</a:t>
-                      </a:r>
-                      <a:r>
-                        <a:rPr lang="es-PE" sz="2800" b="1" baseline="-25000" dirty="0" err="1"/>
-                        <a:t>fumar</a:t>
-                      </a:r>
-                      <a:endParaRPr lang="es-PE" sz="2800" b="1" baseline="-25000" dirty="0"/>
-                    </a:p>
-                  </a:txBody>
-                  <a:tcPr marL="68580" marR="68580" marT="34290" marB="34290"/>
-                </a:tc>
+      <mc:AlternateContent xmlns:mc="http://schemas.openxmlformats.org/markup-compatibility/2006">
+        <mc:Choice xmlns:a14="http://schemas.microsoft.com/office/drawing/2010/main" Requires="a14">
+          <p:graphicFrame>
+            <p:nvGraphicFramePr>
+              <p:cNvPr id="4" name="Marcador de contenido 4">
                 <a:extLst>
-                  <a:ext uri="{0D108BD9-81ED-4DB2-BD59-A6C34878D82A}">
-                    <a16:rowId xmlns:a16="http://schemas.microsoft.com/office/drawing/2014/main" val="3798657958"/>
+                  <a:ext uri="{FF2B5EF4-FFF2-40B4-BE49-F238E27FC236}">
+                    <a16:creationId xmlns:a16="http://schemas.microsoft.com/office/drawing/2014/main" id="{C0004BE9-6D29-40F0-9856-FA92943BBEE7}"/>
                   </a:ext>
                 </a:extLst>
-              </a:tr>
-              <a:tr h="648072">
-                <a:tc>
-                  <a:txBody>
-                    <a:bodyPr/>
-                    <a:lstStyle/>
-                    <a:p>
-                      <a:pPr algn="ctr"/>
-                      <a:r>
-                        <a:rPr lang="es-ES" sz="1800" b="1" dirty="0"/>
-                        <a:t>Regresión Lineal Simple</a:t>
-                      </a:r>
-                    </a:p>
-                    <a:p>
-                      <a:endParaRPr lang="es-PE" sz="1500" b="1" dirty="0"/>
-                    </a:p>
-                  </a:txBody>
-                  <a:tcPr marL="68580" marR="68580" marT="34290" marB="34290"/>
-                </a:tc>
-                <a:tc>
-                  <a:txBody>
-                    <a:bodyPr/>
-                    <a:lstStyle/>
-                    <a:p>
-                      <a:pPr marL="0" marR="0" lvl="0" indent="0" algn="ctr" defTabSz="914400" rtl="0" eaLnBrk="1" fontAlgn="auto" latinLnBrk="0" hangingPunct="1">
-                        <a:lnSpc>
-                          <a:spcPct val="100000"/>
-                        </a:lnSpc>
-                        <a:spcBef>
-                          <a:spcPts val="0"/>
-                        </a:spcBef>
-                        <a:spcAft>
-                          <a:spcPts val="0"/>
-                        </a:spcAft>
-                        <a:buClrTx/>
-                        <a:buSzTx/>
-                        <a:buFontTx/>
-                        <a:buNone/>
-                        <a:tabLst/>
-                        <a:defRPr/>
-                      </a:pPr>
-                      <a:r>
-                        <a:rPr lang="es-ES" sz="2000" dirty="0"/>
-                        <a:t>3.28 L/s</a:t>
-                      </a:r>
-                    </a:p>
-                    <a:p>
-                      <a:pPr marL="0" marR="0" lvl="0" indent="0" algn="ctr" defTabSz="914400" rtl="0" eaLnBrk="1" fontAlgn="auto" latinLnBrk="0" hangingPunct="1">
-                        <a:lnSpc>
-                          <a:spcPct val="100000"/>
-                        </a:lnSpc>
-                        <a:spcBef>
-                          <a:spcPts val="0"/>
-                        </a:spcBef>
-                        <a:spcAft>
-                          <a:spcPts val="0"/>
-                        </a:spcAft>
-                        <a:buClrTx/>
-                        <a:buSzTx/>
-                        <a:buFontTx/>
-                        <a:buNone/>
-                        <a:tabLst/>
-                        <a:defRPr/>
-                      </a:pPr>
-                      <a:r>
-                        <a:rPr lang="es-ES" sz="2000" dirty="0"/>
-                        <a:t>(n = 65)</a:t>
-                      </a:r>
-                      <a:endParaRPr lang="es-PE" sz="2000" dirty="0"/>
-                    </a:p>
-                  </a:txBody>
-                  <a:tcPr marL="68580" marR="68580" marT="34290" marB="34290" anchor="ctr"/>
-                </a:tc>
-                <a:tc>
-                  <a:txBody>
-                    <a:bodyPr/>
-                    <a:lstStyle/>
-                    <a:p>
-                      <a:pPr marL="0" marR="0" lvl="0" indent="0" algn="ctr" defTabSz="914400" rtl="0" eaLnBrk="1" fontAlgn="auto" latinLnBrk="0" hangingPunct="1">
-                        <a:lnSpc>
-                          <a:spcPct val="100000"/>
-                        </a:lnSpc>
-                        <a:spcBef>
-                          <a:spcPts val="0"/>
-                        </a:spcBef>
-                        <a:spcAft>
-                          <a:spcPts val="0"/>
-                        </a:spcAft>
-                        <a:buClrTx/>
-                        <a:buSzTx/>
-                        <a:buFontTx/>
-                        <a:buNone/>
-                        <a:tabLst/>
-                        <a:defRPr/>
-                      </a:pPr>
-                      <a:r>
-                        <a:rPr lang="es-ES" sz="2000" dirty="0"/>
-                        <a:t>2.56  L/s</a:t>
-                      </a:r>
-                    </a:p>
-                    <a:p>
-                      <a:pPr marL="0" marR="0" lvl="0" indent="0" algn="ctr" defTabSz="914400" rtl="0" eaLnBrk="1" fontAlgn="auto" latinLnBrk="0" hangingPunct="1">
-                        <a:lnSpc>
-                          <a:spcPct val="100000"/>
-                        </a:lnSpc>
-                        <a:spcBef>
-                          <a:spcPts val="0"/>
-                        </a:spcBef>
-                        <a:spcAft>
-                          <a:spcPts val="0"/>
-                        </a:spcAft>
-                        <a:buClrTx/>
-                        <a:buSzTx/>
-                        <a:buFontTx/>
-                        <a:buNone/>
-                        <a:tabLst/>
-                        <a:defRPr/>
-                      </a:pPr>
-                      <a:r>
-                        <a:rPr lang="es-ES" sz="2000" dirty="0"/>
-                        <a:t>(n = 589)</a:t>
-                      </a:r>
-                      <a:endParaRPr lang="es-PE" sz="2000" dirty="0"/>
-                    </a:p>
-                  </a:txBody>
-                  <a:tcPr marL="68580" marR="68580" marT="34290" marB="34290" anchor="ctr"/>
-                </a:tc>
-                <a:tc>
-                  <a:txBody>
-                    <a:bodyPr/>
-                    <a:lstStyle/>
-                    <a:p>
-                      <a:pPr marL="0" marR="0" lvl="0" indent="0" algn="ctr" defTabSz="914400" rtl="0" eaLnBrk="1" fontAlgn="auto" latinLnBrk="0" hangingPunct="1">
-                        <a:lnSpc>
-                          <a:spcPct val="100000"/>
-                        </a:lnSpc>
-                        <a:spcBef>
-                          <a:spcPts val="0"/>
-                        </a:spcBef>
-                        <a:spcAft>
-                          <a:spcPts val="0"/>
-                        </a:spcAft>
-                        <a:buClrTx/>
-                        <a:buSzTx/>
-                        <a:buFontTx/>
-                        <a:buNone/>
-                        <a:tabLst/>
-                        <a:defRPr/>
-                      </a:pPr>
-                      <a:r>
-                        <a:rPr lang="es-ES" sz="2000" kern="1200" dirty="0">
-                          <a:solidFill>
-                            <a:schemeClr val="tx1"/>
-                          </a:solidFill>
-                          <a:latin typeface="+mn-lt"/>
-                          <a:ea typeface="+mn-ea"/>
-                          <a:cs typeface="+mn-cs"/>
-                        </a:rPr>
-                        <a:t>0.71 L/s</a:t>
-                      </a:r>
-                    </a:p>
-                    <a:p>
-                      <a:pPr marL="0" marR="0" lvl="0" indent="0" algn="ctr" defTabSz="914400" rtl="0" eaLnBrk="1" fontAlgn="auto" latinLnBrk="0" hangingPunct="1">
-                        <a:lnSpc>
-                          <a:spcPct val="100000"/>
-                        </a:lnSpc>
-                        <a:spcBef>
-                          <a:spcPts val="0"/>
-                        </a:spcBef>
-                        <a:spcAft>
-                          <a:spcPts val="0"/>
-                        </a:spcAft>
-                        <a:buClrTx/>
-                        <a:buSzTx/>
-                        <a:buFontTx/>
-                        <a:buNone/>
-                        <a:tabLst/>
-                        <a:defRPr/>
-                      </a:pPr>
-                      <a:r>
-                        <a:rPr lang="es-ES" sz="2000" kern="1200" dirty="0">
-                          <a:solidFill>
-                            <a:schemeClr val="tx1"/>
-                          </a:solidFill>
-                          <a:latin typeface="+mn-lt"/>
-                          <a:ea typeface="+mn-ea"/>
-                          <a:cs typeface="+mn-cs"/>
-                        </a:rPr>
-                        <a:t>(n = 654)</a:t>
-                      </a:r>
-                    </a:p>
-                  </a:txBody>
-                  <a:tcPr marL="68580" marR="68580" marT="34290" marB="34290" anchor="ctr"/>
-                </a:tc>
+              </p:cNvPr>
+              <p:cNvGraphicFramePr>
+                <a:graphicFrameLocks/>
+              </p:cNvGraphicFramePr>
+              <p:nvPr>
+                <p:extLst>
+                  <p:ext uri="{D42A27DB-BD31-4B8C-83A1-F6EECF244321}">
+                    <p14:modId xmlns:p14="http://schemas.microsoft.com/office/powerpoint/2010/main" val="1288463348"/>
+                  </p:ext>
+                </p:extLst>
+              </p:nvPr>
+            </p:nvGraphicFramePr>
+            <p:xfrm>
+              <a:off x="512413" y="1837317"/>
+              <a:ext cx="8119171" cy="1748155"/>
+            </p:xfrm>
+            <a:graphic>
+              <a:graphicData uri="http://schemas.openxmlformats.org/drawingml/2006/table">
+                <a:tbl>
+                  <a:tblPr firstRow="1" bandRow="1">
+                    <a:tableStyleId>{5940675A-B579-460E-94D1-54222C63F5DA}</a:tableStyleId>
+                  </a:tblPr>
+                  <a:tblGrid>
+                    <a:gridCol w="1494435">
+                      <a:extLst>
+                        <a:ext uri="{9D8B030D-6E8A-4147-A177-3AD203B41FA5}">
+                          <a16:colId xmlns:a16="http://schemas.microsoft.com/office/drawing/2014/main" val="3492540604"/>
+                        </a:ext>
+                      </a:extLst>
+                    </a:gridCol>
+                    <a:gridCol w="2093494">
+                      <a:extLst>
+                        <a:ext uri="{9D8B030D-6E8A-4147-A177-3AD203B41FA5}">
+                          <a16:colId xmlns:a16="http://schemas.microsoft.com/office/drawing/2014/main" val="2145709817"/>
+                        </a:ext>
+                      </a:extLst>
+                    </a:gridCol>
+                    <a:gridCol w="2520280">
+                      <a:extLst>
+                        <a:ext uri="{9D8B030D-6E8A-4147-A177-3AD203B41FA5}">
+                          <a16:colId xmlns:a16="http://schemas.microsoft.com/office/drawing/2014/main" val="41199867"/>
+                        </a:ext>
+                      </a:extLst>
+                    </a:gridCol>
+                    <a:gridCol w="2010962">
+                      <a:extLst>
+                        <a:ext uri="{9D8B030D-6E8A-4147-A177-3AD203B41FA5}">
+                          <a16:colId xmlns:a16="http://schemas.microsoft.com/office/drawing/2014/main" val="2783525654"/>
+                        </a:ext>
+                      </a:extLst>
+                    </a:gridCol>
+                  </a:tblGrid>
+                  <a:tr h="722170">
+                    <a:tc>
+                      <a:txBody>
+                        <a:bodyPr/>
+                        <a:lstStyle/>
+                        <a:p>
+                          <a:endParaRPr lang="es-PE" sz="1500" dirty="0"/>
+                        </a:p>
+                      </a:txBody>
+                      <a:tcPr marL="68580" marR="68580" marT="34290" marB="34290"/>
+                    </a:tc>
+                    <a:tc>
+                      <a:txBody>
+                        <a:bodyPr/>
+                        <a:lstStyle/>
+                        <a:p>
+                          <a:pPr algn="ctr"/>
+                          <a:r>
+                            <a:rPr lang="es-ES" sz="1800" b="1" dirty="0"/>
+                            <a:t>Fuma</a:t>
+                          </a:r>
+                        </a:p>
+                        <a:p>
+                          <a:pPr algn="ctr"/>
+                          <a:r>
+                            <a:rPr lang="es-ES" sz="1800" b="1" dirty="0"/>
+                            <a:t>(promedio de VEF)</a:t>
+                          </a:r>
+                          <a:endParaRPr lang="es-PE" sz="1800" b="1" dirty="0"/>
+                        </a:p>
+                      </a:txBody>
+                      <a:tcPr marL="68580" marR="68580" marT="34290" marB="34290"/>
+                    </a:tc>
+                    <a:tc>
+                      <a:txBody>
+                        <a:bodyPr/>
+                        <a:lstStyle/>
+                        <a:p>
+                          <a:pPr algn="ctr"/>
+                          <a:r>
+                            <a:rPr lang="es-ES" sz="1800" b="1" dirty="0"/>
+                            <a:t>No fuma</a:t>
+                          </a:r>
+                        </a:p>
+                        <a:p>
+                          <a:pPr algn="ctr"/>
+                          <a:r>
+                            <a:rPr lang="es-ES" sz="1800" b="1" dirty="0"/>
+                            <a:t>(promedio de VEF)</a:t>
+                          </a:r>
+                          <a:endParaRPr lang="es-PE" sz="1800" b="1" dirty="0"/>
+                        </a:p>
+                      </a:txBody>
+                      <a:tcPr marL="68580" marR="68580" marT="34290" marB="34290"/>
+                    </a:tc>
+                    <a:tc>
+                      <a:txBody>
+                        <a:bodyPr/>
+                        <a:lstStyle/>
+                        <a:p>
+                          <a:pPr algn="ctr"/>
+                          <a14:m>
+                            <m:oMathPara xmlns:m="http://schemas.openxmlformats.org/officeDocument/2006/math">
+                              <m:oMathParaPr>
+                                <m:jc m:val="centerGroup"/>
+                              </m:oMathParaPr>
+                              <m:oMath xmlns:m="http://schemas.openxmlformats.org/officeDocument/2006/math">
+                                <a:fld id="{825F15A7-03F4-43D7-82C5-3E23DA2F108C}" type="mathplaceholder">
+                                  <a:rPr lang="es-PE" sz="2800" b="1" i="1" baseline="-25000" smtClean="0">
+                                    <a:latin typeface="Cambria Math" panose="02040503050406030204" pitchFamily="18" charset="0"/>
+                                  </a:rPr>
+                                  <a:t>Escriba aquí la ecuación.</a:t>
+                                </a:fld>
+                              </m:oMath>
+                            </m:oMathPara>
+                          </a14:m>
+                          <a:endParaRPr lang="es-PE" sz="2800" b="1" baseline="-25000" dirty="0"/>
+                        </a:p>
+                      </a:txBody>
+                      <a:tcPr marL="68580" marR="68580" marT="34290" marB="34290"/>
+                    </a:tc>
+                    <a:extLst>
+                      <a:ext uri="{0D108BD9-81ED-4DB2-BD59-A6C34878D82A}">
+                        <a16:rowId xmlns:a16="http://schemas.microsoft.com/office/drawing/2014/main" val="3798657958"/>
+                      </a:ext>
+                    </a:extLst>
+                  </a:tr>
+                  <a:tr h="648072">
+                    <a:tc>
+                      <a:txBody>
+                        <a:bodyPr/>
+                        <a:lstStyle/>
+                        <a:p>
+                          <a:pPr algn="ctr"/>
+                          <a:r>
+                            <a:rPr lang="es-ES" sz="1800" b="1" dirty="0"/>
+                            <a:t>Regresión Lineal Simple</a:t>
+                          </a:r>
+                        </a:p>
+                        <a:p>
+                          <a:endParaRPr lang="es-PE" sz="1500" b="1" dirty="0"/>
+                        </a:p>
+                      </a:txBody>
+                      <a:tcPr marL="68580" marR="68580" marT="34290" marB="34290"/>
+                    </a:tc>
+                    <a:tc>
+                      <a:txBody>
+                        <a:bodyPr/>
+                        <a:lstStyle/>
+                        <a:p>
+                          <a:pPr marL="0" marR="0" lvl="0" indent="0" algn="ctr" defTabSz="914400" rtl="0" eaLnBrk="1" fontAlgn="auto" latinLnBrk="0" hangingPunct="1">
+                            <a:lnSpc>
+                              <a:spcPct val="100000"/>
+                            </a:lnSpc>
+                            <a:spcBef>
+                              <a:spcPts val="0"/>
+                            </a:spcBef>
+                            <a:spcAft>
+                              <a:spcPts val="0"/>
+                            </a:spcAft>
+                            <a:buClrTx/>
+                            <a:buSzTx/>
+                            <a:buFontTx/>
+                            <a:buNone/>
+                            <a:tabLst/>
+                            <a:defRPr/>
+                          </a:pPr>
+                          <a:r>
+                            <a:rPr lang="es-ES" sz="2000" dirty="0"/>
+                            <a:t>3.28 L/s</a:t>
+                          </a:r>
+                        </a:p>
+                        <a:p>
+                          <a:pPr marL="0" marR="0" lvl="0" indent="0" algn="ctr" defTabSz="914400" rtl="0" eaLnBrk="1" fontAlgn="auto" latinLnBrk="0" hangingPunct="1">
+                            <a:lnSpc>
+                              <a:spcPct val="100000"/>
+                            </a:lnSpc>
+                            <a:spcBef>
+                              <a:spcPts val="0"/>
+                            </a:spcBef>
+                            <a:spcAft>
+                              <a:spcPts val="0"/>
+                            </a:spcAft>
+                            <a:buClrTx/>
+                            <a:buSzTx/>
+                            <a:buFontTx/>
+                            <a:buNone/>
+                            <a:tabLst/>
+                            <a:defRPr/>
+                          </a:pPr>
+                          <a:r>
+                            <a:rPr lang="es-ES" sz="2000" dirty="0"/>
+                            <a:t>(n = 65)</a:t>
+                          </a:r>
+                          <a:endParaRPr lang="es-PE" sz="2000" dirty="0"/>
+                        </a:p>
+                      </a:txBody>
+                      <a:tcPr marL="68580" marR="68580" marT="34290" marB="34290" anchor="ctr"/>
+                    </a:tc>
+                    <a:tc>
+                      <a:txBody>
+                        <a:bodyPr/>
+                        <a:lstStyle/>
+                        <a:p>
+                          <a:pPr marL="0" marR="0" lvl="0" indent="0" algn="ctr" defTabSz="914400" rtl="0" eaLnBrk="1" fontAlgn="auto" latinLnBrk="0" hangingPunct="1">
+                            <a:lnSpc>
+                              <a:spcPct val="100000"/>
+                            </a:lnSpc>
+                            <a:spcBef>
+                              <a:spcPts val="0"/>
+                            </a:spcBef>
+                            <a:spcAft>
+                              <a:spcPts val="0"/>
+                            </a:spcAft>
+                            <a:buClrTx/>
+                            <a:buSzTx/>
+                            <a:buFontTx/>
+                            <a:buNone/>
+                            <a:tabLst/>
+                            <a:defRPr/>
+                          </a:pPr>
+                          <a:r>
+                            <a:rPr lang="es-ES" sz="2000" dirty="0"/>
+                            <a:t>2.56  L/s</a:t>
+                          </a:r>
+                        </a:p>
+                        <a:p>
+                          <a:pPr marL="0" marR="0" lvl="0" indent="0" algn="ctr" defTabSz="914400" rtl="0" eaLnBrk="1" fontAlgn="auto" latinLnBrk="0" hangingPunct="1">
+                            <a:lnSpc>
+                              <a:spcPct val="100000"/>
+                            </a:lnSpc>
+                            <a:spcBef>
+                              <a:spcPts val="0"/>
+                            </a:spcBef>
+                            <a:spcAft>
+                              <a:spcPts val="0"/>
+                            </a:spcAft>
+                            <a:buClrTx/>
+                            <a:buSzTx/>
+                            <a:buFontTx/>
+                            <a:buNone/>
+                            <a:tabLst/>
+                            <a:defRPr/>
+                          </a:pPr>
+                          <a:r>
+                            <a:rPr lang="es-ES" sz="2000" dirty="0"/>
+                            <a:t>(n = 589)</a:t>
+                          </a:r>
+                          <a:endParaRPr lang="es-PE" sz="2000" dirty="0"/>
+                        </a:p>
+                      </a:txBody>
+                      <a:tcPr marL="68580" marR="68580" marT="34290" marB="34290" anchor="ctr"/>
+                    </a:tc>
+                    <a:tc>
+                      <a:txBody>
+                        <a:bodyPr/>
+                        <a:lstStyle/>
+                        <a:p>
+                          <a:pPr marL="0" marR="0" lvl="0" indent="0" algn="ctr" defTabSz="914400" rtl="0" eaLnBrk="1" fontAlgn="auto" latinLnBrk="0" hangingPunct="1">
+                            <a:lnSpc>
+                              <a:spcPct val="100000"/>
+                            </a:lnSpc>
+                            <a:spcBef>
+                              <a:spcPts val="0"/>
+                            </a:spcBef>
+                            <a:spcAft>
+                              <a:spcPts val="0"/>
+                            </a:spcAft>
+                            <a:buClrTx/>
+                            <a:buSzTx/>
+                            <a:buFontTx/>
+                            <a:buNone/>
+                            <a:tabLst/>
+                            <a:defRPr/>
+                          </a:pPr>
+                          <a:r>
+                            <a:rPr lang="es-ES" sz="2000" kern="1200" dirty="0">
+                              <a:solidFill>
+                                <a:schemeClr val="tx1"/>
+                              </a:solidFill>
+                              <a:latin typeface="+mn-lt"/>
+                              <a:ea typeface="+mn-ea"/>
+                              <a:cs typeface="+mn-cs"/>
+                            </a:rPr>
+                            <a:t>0.71 L/s</a:t>
+                          </a:r>
+                        </a:p>
+                        <a:p>
+                          <a:pPr marL="0" marR="0" lvl="0" indent="0" algn="ctr" defTabSz="914400" rtl="0" eaLnBrk="1" fontAlgn="auto" latinLnBrk="0" hangingPunct="1">
+                            <a:lnSpc>
+                              <a:spcPct val="100000"/>
+                            </a:lnSpc>
+                            <a:spcBef>
+                              <a:spcPts val="0"/>
+                            </a:spcBef>
+                            <a:spcAft>
+                              <a:spcPts val="0"/>
+                            </a:spcAft>
+                            <a:buClrTx/>
+                            <a:buSzTx/>
+                            <a:buFontTx/>
+                            <a:buNone/>
+                            <a:tabLst/>
+                            <a:defRPr/>
+                          </a:pPr>
+                          <a:r>
+                            <a:rPr lang="es-ES" sz="2000" kern="1200" dirty="0">
+                              <a:solidFill>
+                                <a:schemeClr val="tx1"/>
+                              </a:solidFill>
+                              <a:latin typeface="+mn-lt"/>
+                              <a:ea typeface="+mn-ea"/>
+                              <a:cs typeface="+mn-cs"/>
+                            </a:rPr>
+                            <a:t>(n = 654)</a:t>
+                          </a:r>
+                        </a:p>
+                      </a:txBody>
+                      <a:tcPr marL="68580" marR="68580" marT="34290" marB="34290" anchor="ctr"/>
+                    </a:tc>
+                    <a:extLst>
+                      <a:ext uri="{0D108BD9-81ED-4DB2-BD59-A6C34878D82A}">
+                        <a16:rowId xmlns:a16="http://schemas.microsoft.com/office/drawing/2014/main" val="2831355775"/>
+                      </a:ext>
+                    </a:extLst>
+                  </a:tr>
+                </a:tbl>
+              </a:graphicData>
+            </a:graphic>
+          </p:graphicFrame>
+        </mc:Choice>
+        <mc:Fallback>
+          <p:graphicFrame>
+            <p:nvGraphicFramePr>
+              <p:cNvPr id="4" name="Marcador de contenido 4">
                 <a:extLst>
-                  <a:ext uri="{0D108BD9-81ED-4DB2-BD59-A6C34878D82A}">
-                    <a16:rowId xmlns:a16="http://schemas.microsoft.com/office/drawing/2014/main" val="2831355775"/>
+                  <a:ext uri="{FF2B5EF4-FFF2-40B4-BE49-F238E27FC236}">
+                    <a16:creationId xmlns:a16="http://schemas.microsoft.com/office/drawing/2014/main" id="{C0004BE9-6D29-40F0-9856-FA92943BBEE7}"/>
                   </a:ext>
                 </a:extLst>
-              </a:tr>
-            </a:tbl>
-          </a:graphicData>
-        </a:graphic>
-      </p:graphicFrame>
+              </p:cNvPr>
+              <p:cNvGraphicFramePr>
+                <a:graphicFrameLocks/>
+              </p:cNvGraphicFramePr>
+              <p:nvPr>
+                <p:extLst>
+                  <p:ext uri="{D42A27DB-BD31-4B8C-83A1-F6EECF244321}">
+                    <p14:modId xmlns:p14="http://schemas.microsoft.com/office/powerpoint/2010/main" val="1288463348"/>
+                  </p:ext>
+                </p:extLst>
+              </p:nvPr>
+            </p:nvGraphicFramePr>
+            <p:xfrm>
+              <a:off x="512413" y="1837317"/>
+              <a:ext cx="8119171" cy="1748155"/>
+            </p:xfrm>
+            <a:graphic>
+              <a:graphicData uri="http://schemas.openxmlformats.org/drawingml/2006/table">
+                <a:tbl>
+                  <a:tblPr firstRow="1" bandRow="1">
+                    <a:tableStyleId>{5940675A-B579-460E-94D1-54222C63F5DA}</a:tableStyleId>
+                  </a:tblPr>
+                  <a:tblGrid>
+                    <a:gridCol w="1494435">
+                      <a:extLst>
+                        <a:ext uri="{9D8B030D-6E8A-4147-A177-3AD203B41FA5}">
+                          <a16:colId xmlns:a16="http://schemas.microsoft.com/office/drawing/2014/main" val="3492540604"/>
+                        </a:ext>
+                      </a:extLst>
+                    </a:gridCol>
+                    <a:gridCol w="2093494">
+                      <a:extLst>
+                        <a:ext uri="{9D8B030D-6E8A-4147-A177-3AD203B41FA5}">
+                          <a16:colId xmlns:a16="http://schemas.microsoft.com/office/drawing/2014/main" val="2145709817"/>
+                        </a:ext>
+                      </a:extLst>
+                    </a:gridCol>
+                    <a:gridCol w="2520280">
+                      <a:extLst>
+                        <a:ext uri="{9D8B030D-6E8A-4147-A177-3AD203B41FA5}">
+                          <a16:colId xmlns:a16="http://schemas.microsoft.com/office/drawing/2014/main" val="41199867"/>
+                        </a:ext>
+                      </a:extLst>
+                    </a:gridCol>
+                    <a:gridCol w="2010962">
+                      <a:extLst>
+                        <a:ext uri="{9D8B030D-6E8A-4147-A177-3AD203B41FA5}">
+                          <a16:colId xmlns:a16="http://schemas.microsoft.com/office/drawing/2014/main" val="2783525654"/>
+                        </a:ext>
+                      </a:extLst>
+                    </a:gridCol>
+                  </a:tblGrid>
+                  <a:tr h="902335">
+                    <a:tc>
+                      <a:txBody>
+                        <a:bodyPr/>
+                        <a:lstStyle/>
+                        <a:p>
+                          <a:endParaRPr lang="es-PE" sz="1500" dirty="0"/>
+                        </a:p>
+                      </a:txBody>
+                      <a:tcPr marL="68580" marR="68580" marT="34290" marB="34290"/>
+                    </a:tc>
+                    <a:tc>
+                      <a:txBody>
+                        <a:bodyPr/>
+                        <a:lstStyle/>
+                        <a:p>
+                          <a:pPr algn="ctr"/>
+                          <a:r>
+                            <a:rPr lang="es-ES" sz="1800" b="1" dirty="0"/>
+                            <a:t>Fuma</a:t>
+                          </a:r>
+                        </a:p>
+                        <a:p>
+                          <a:pPr algn="ctr"/>
+                          <a:r>
+                            <a:rPr lang="es-ES" sz="1800" b="1" dirty="0"/>
+                            <a:t>(promedio de VEF)</a:t>
+                          </a:r>
+                          <a:endParaRPr lang="es-PE" sz="1800" b="1" dirty="0"/>
+                        </a:p>
+                      </a:txBody>
+                      <a:tcPr marL="68580" marR="68580" marT="34290" marB="34290"/>
+                    </a:tc>
+                    <a:tc>
+                      <a:txBody>
+                        <a:bodyPr/>
+                        <a:lstStyle/>
+                        <a:p>
+                          <a:pPr algn="ctr"/>
+                          <a:r>
+                            <a:rPr lang="es-ES" sz="1800" b="1" dirty="0"/>
+                            <a:t>No fuma</a:t>
+                          </a:r>
+                        </a:p>
+                        <a:p>
+                          <a:pPr algn="ctr"/>
+                          <a:r>
+                            <a:rPr lang="es-ES" sz="1800" b="1" dirty="0"/>
+                            <a:t>(promedio de VEF)</a:t>
+                          </a:r>
+                          <a:endParaRPr lang="es-PE" sz="1800" b="1" dirty="0"/>
+                        </a:p>
+                      </a:txBody>
+                      <a:tcPr marL="68580" marR="68580" marT="34290" marB="34290"/>
+                    </a:tc>
+                    <a:tc>
+                      <a:txBody>
+                        <a:bodyPr/>
+                        <a:lstStyle/>
+                        <a:p>
+                          <a:endParaRPr lang="es-MX"/>
+                        </a:p>
+                      </a:txBody>
+                      <a:tcPr marL="68580" marR="68580" marT="34290" marB="34290">
+                        <a:blipFill>
+                          <a:blip r:embed="rId2"/>
+                          <a:stretch>
+                            <a:fillRect l="-303939" t="-4698" r="-909" b="-96644"/>
+                          </a:stretch>
+                        </a:blipFill>
+                      </a:tcPr>
+                    </a:tc>
+                    <a:extLst>
+                      <a:ext uri="{0D108BD9-81ED-4DB2-BD59-A6C34878D82A}">
+                        <a16:rowId xmlns:a16="http://schemas.microsoft.com/office/drawing/2014/main" val="3798657958"/>
+                      </a:ext>
+                    </a:extLst>
+                  </a:tr>
+                  <a:tr h="845820">
+                    <a:tc>
+                      <a:txBody>
+                        <a:bodyPr/>
+                        <a:lstStyle/>
+                        <a:p>
+                          <a:pPr algn="ctr"/>
+                          <a:r>
+                            <a:rPr lang="es-ES" sz="1800" b="1" dirty="0"/>
+                            <a:t>Regresión Lineal Simple</a:t>
+                          </a:r>
+                        </a:p>
+                        <a:p>
+                          <a:endParaRPr lang="es-PE" sz="1500" b="1" dirty="0"/>
+                        </a:p>
+                      </a:txBody>
+                      <a:tcPr marL="68580" marR="68580" marT="34290" marB="34290"/>
+                    </a:tc>
+                    <a:tc>
+                      <a:txBody>
+                        <a:bodyPr/>
+                        <a:lstStyle/>
+                        <a:p>
+                          <a:pPr marL="0" marR="0" lvl="0" indent="0" algn="ctr" defTabSz="914400" rtl="0" eaLnBrk="1" fontAlgn="auto" latinLnBrk="0" hangingPunct="1">
+                            <a:lnSpc>
+                              <a:spcPct val="100000"/>
+                            </a:lnSpc>
+                            <a:spcBef>
+                              <a:spcPts val="0"/>
+                            </a:spcBef>
+                            <a:spcAft>
+                              <a:spcPts val="0"/>
+                            </a:spcAft>
+                            <a:buClrTx/>
+                            <a:buSzTx/>
+                            <a:buFontTx/>
+                            <a:buNone/>
+                            <a:tabLst/>
+                            <a:defRPr/>
+                          </a:pPr>
+                          <a:r>
+                            <a:rPr lang="es-ES" sz="2000" dirty="0"/>
+                            <a:t>3.28 L/s</a:t>
+                          </a:r>
+                        </a:p>
+                        <a:p>
+                          <a:pPr marL="0" marR="0" lvl="0" indent="0" algn="ctr" defTabSz="914400" rtl="0" eaLnBrk="1" fontAlgn="auto" latinLnBrk="0" hangingPunct="1">
+                            <a:lnSpc>
+                              <a:spcPct val="100000"/>
+                            </a:lnSpc>
+                            <a:spcBef>
+                              <a:spcPts val="0"/>
+                            </a:spcBef>
+                            <a:spcAft>
+                              <a:spcPts val="0"/>
+                            </a:spcAft>
+                            <a:buClrTx/>
+                            <a:buSzTx/>
+                            <a:buFontTx/>
+                            <a:buNone/>
+                            <a:tabLst/>
+                            <a:defRPr/>
+                          </a:pPr>
+                          <a:r>
+                            <a:rPr lang="es-ES" sz="2000" dirty="0"/>
+                            <a:t>(n = 65)</a:t>
+                          </a:r>
+                          <a:endParaRPr lang="es-PE" sz="2000" dirty="0"/>
+                        </a:p>
+                      </a:txBody>
+                      <a:tcPr marL="68580" marR="68580" marT="34290" marB="34290" anchor="ctr"/>
+                    </a:tc>
+                    <a:tc>
+                      <a:txBody>
+                        <a:bodyPr/>
+                        <a:lstStyle/>
+                        <a:p>
+                          <a:pPr marL="0" marR="0" lvl="0" indent="0" algn="ctr" defTabSz="914400" rtl="0" eaLnBrk="1" fontAlgn="auto" latinLnBrk="0" hangingPunct="1">
+                            <a:lnSpc>
+                              <a:spcPct val="100000"/>
+                            </a:lnSpc>
+                            <a:spcBef>
+                              <a:spcPts val="0"/>
+                            </a:spcBef>
+                            <a:spcAft>
+                              <a:spcPts val="0"/>
+                            </a:spcAft>
+                            <a:buClrTx/>
+                            <a:buSzTx/>
+                            <a:buFontTx/>
+                            <a:buNone/>
+                            <a:tabLst/>
+                            <a:defRPr/>
+                          </a:pPr>
+                          <a:r>
+                            <a:rPr lang="es-ES" sz="2000" dirty="0"/>
+                            <a:t>2.56  L/s</a:t>
+                          </a:r>
+                        </a:p>
+                        <a:p>
+                          <a:pPr marL="0" marR="0" lvl="0" indent="0" algn="ctr" defTabSz="914400" rtl="0" eaLnBrk="1" fontAlgn="auto" latinLnBrk="0" hangingPunct="1">
+                            <a:lnSpc>
+                              <a:spcPct val="100000"/>
+                            </a:lnSpc>
+                            <a:spcBef>
+                              <a:spcPts val="0"/>
+                            </a:spcBef>
+                            <a:spcAft>
+                              <a:spcPts val="0"/>
+                            </a:spcAft>
+                            <a:buClrTx/>
+                            <a:buSzTx/>
+                            <a:buFontTx/>
+                            <a:buNone/>
+                            <a:tabLst/>
+                            <a:defRPr/>
+                          </a:pPr>
+                          <a:r>
+                            <a:rPr lang="es-ES" sz="2000" dirty="0"/>
+                            <a:t>(n = 589)</a:t>
+                          </a:r>
+                          <a:endParaRPr lang="es-PE" sz="2000" dirty="0"/>
+                        </a:p>
+                      </a:txBody>
+                      <a:tcPr marL="68580" marR="68580" marT="34290" marB="34290" anchor="ctr"/>
+                    </a:tc>
+                    <a:tc>
+                      <a:txBody>
+                        <a:bodyPr/>
+                        <a:lstStyle/>
+                        <a:p>
+                          <a:pPr marL="0" marR="0" lvl="0" indent="0" algn="ctr" defTabSz="914400" rtl="0" eaLnBrk="1" fontAlgn="auto" latinLnBrk="0" hangingPunct="1">
+                            <a:lnSpc>
+                              <a:spcPct val="100000"/>
+                            </a:lnSpc>
+                            <a:spcBef>
+                              <a:spcPts val="0"/>
+                            </a:spcBef>
+                            <a:spcAft>
+                              <a:spcPts val="0"/>
+                            </a:spcAft>
+                            <a:buClrTx/>
+                            <a:buSzTx/>
+                            <a:buFontTx/>
+                            <a:buNone/>
+                            <a:tabLst/>
+                            <a:defRPr/>
+                          </a:pPr>
+                          <a:r>
+                            <a:rPr lang="es-ES" sz="2000" kern="1200" dirty="0">
+                              <a:solidFill>
+                                <a:schemeClr val="tx1"/>
+                              </a:solidFill>
+                              <a:latin typeface="+mn-lt"/>
+                              <a:ea typeface="+mn-ea"/>
+                              <a:cs typeface="+mn-cs"/>
+                            </a:rPr>
+                            <a:t>0.71 L/s</a:t>
+                          </a:r>
+                        </a:p>
+                        <a:p>
+                          <a:pPr marL="0" marR="0" lvl="0" indent="0" algn="ctr" defTabSz="914400" rtl="0" eaLnBrk="1" fontAlgn="auto" latinLnBrk="0" hangingPunct="1">
+                            <a:lnSpc>
+                              <a:spcPct val="100000"/>
+                            </a:lnSpc>
+                            <a:spcBef>
+                              <a:spcPts val="0"/>
+                            </a:spcBef>
+                            <a:spcAft>
+                              <a:spcPts val="0"/>
+                            </a:spcAft>
+                            <a:buClrTx/>
+                            <a:buSzTx/>
+                            <a:buFontTx/>
+                            <a:buNone/>
+                            <a:tabLst/>
+                            <a:defRPr/>
+                          </a:pPr>
+                          <a:r>
+                            <a:rPr lang="es-ES" sz="2000" kern="1200" dirty="0">
+                              <a:solidFill>
+                                <a:schemeClr val="tx1"/>
+                              </a:solidFill>
+                              <a:latin typeface="+mn-lt"/>
+                              <a:ea typeface="+mn-ea"/>
+                              <a:cs typeface="+mn-cs"/>
+                            </a:rPr>
+                            <a:t>(n = 654)</a:t>
+                          </a:r>
+                        </a:p>
+                      </a:txBody>
+                      <a:tcPr marL="68580" marR="68580" marT="34290" marB="34290" anchor="ctr"/>
+                    </a:tc>
+                    <a:extLst>
+                      <a:ext uri="{0D108BD9-81ED-4DB2-BD59-A6C34878D82A}">
+                        <a16:rowId xmlns:a16="http://schemas.microsoft.com/office/drawing/2014/main" val="2831355775"/>
+                      </a:ext>
+                    </a:extLst>
+                  </a:tr>
+                </a:tbl>
+              </a:graphicData>
+            </a:graphic>
+          </p:graphicFrame>
+        </mc:Fallback>
+      </mc:AlternateContent>
       <p:sp>
         <p:nvSpPr>
           <p:cNvPr id="6" name="Title 1">
@@ -12495,7 +12849,7 @@
                 <a:avLst/>
               </a:prstGeom>
               <a:blipFill>
-                <a:blip r:embed="rId2"/>
+                <a:blip r:embed="rId3"/>
                 <a:stretch>
                   <a:fillRect t="-5195" b="-18182"/>
                 </a:stretch>
@@ -13412,7 +13766,7 @@
           <p:nvPr>
             <p:extLst>
               <p:ext uri="{D42A27DB-BD31-4B8C-83A1-F6EECF244321}">
-                <p14:modId xmlns:p14="http://schemas.microsoft.com/office/powerpoint/2010/main" val="3600309498"/>
+                <p14:modId xmlns:p14="http://schemas.microsoft.com/office/powerpoint/2010/main" val="1791856816"/>
               </p:ext>
             </p:extLst>
           </p:nvPr>
@@ -14344,7 +14698,7 @@
                           <a:ea typeface="+mn-ea"/>
                           <a:cs typeface="+mn-cs"/>
                         </a:rPr>
-                        <a:t>-0.16 L/s</a:t>
+                        <a:t>-0.154 L/s</a:t>
                       </a:r>
                     </a:p>
                     <a:p>
@@ -14842,7 +15196,7 @@
           <p:nvPr>
             <p:extLst>
               <p:ext uri="{D42A27DB-BD31-4B8C-83A1-F6EECF244321}">
-                <p14:modId xmlns:p14="http://schemas.microsoft.com/office/powerpoint/2010/main" val="2479501823"/>
+                <p14:modId xmlns:p14="http://schemas.microsoft.com/office/powerpoint/2010/main" val="3595272246"/>
               </p:ext>
             </p:extLst>
           </p:nvPr>
@@ -15095,6 +15449,17 @@
                     <a:p>
                       <a:pPr algn="ctr"/>
                       <a:r>
+                        <a:rPr lang="es-ES" sz="2000" kern="1200">
+                          <a:solidFill>
+                            <a:schemeClr val="tx1"/>
+                          </a:solidFill>
+                          <a:latin typeface="+mn-lt"/>
+                          <a:ea typeface="+mn-ea"/>
+                          <a:cs typeface="+mn-cs"/>
+                        </a:rPr>
+                        <a:t>-0.154 </a:t>
+                      </a:r>
+                      <a:r>
                         <a:rPr lang="es-ES" sz="2000" kern="1200" dirty="0">
                           <a:solidFill>
                             <a:schemeClr val="tx1"/>
@@ -15103,7 +15468,7 @@
                           <a:ea typeface="+mn-ea"/>
                           <a:cs typeface="+mn-cs"/>
                         </a:rPr>
-                        <a:t>-0.16 L/s</a:t>
+                        <a:t>L/s</a:t>
                       </a:r>
                     </a:p>
                     <a:p>

</xml_diff>